<commit_message>
Revise timing language in bioRxiv submission materials for defensibility
Replace unsupported quantitative timing claims with defensible qualitative language:
- "multiple hours per gene" → "labor-intensive per gene"
- "115-480× faster" → "orders of magnitude faster"
- Remove specific "2-8 hours" estimates without empirical validation

Updated files:
- bioRxiv preprint draft (abstract, intro, results, discussion, conclusions)
- One-page summary and email template
- Conference poster markdown and generation script
- Regenerated conference poster PowerPoint

Rationale: Focus on demonstrable workflow improvements (automation,
integration, parallelization) rather than unvalidated time comparisons.
Maintains impact while ensuring claims can withstand peer review.

🤖 Generated with [Claude Code](https://claude.com/claude-code)

Co-Authored-By: Claude <noreply@anthropic.com>
</commit_message>
<xml_diff>
--- a/biorxiv/REGNETAGENTS_CONFERENCE_POSTER.pptx
+++ b/biorxiv/REGNETAGENTS_CONFERENCE_POSTER.pptx
@@ -3284,12 +3284,12 @@
               </a:defRPr>
             </a:pPr>
             <a:r>
-              <a:t>RegNetAgents is a validated LLM-powered multi-agent AI framework that automates gene regulatory network analysis through intelligent workflow orchestration, transforming multi-hour manual processes into second-scale automated analysis. The system deploys four specialized LLM-powered domain agents (cancer biology, drug discovery, clinical relevance, systems biology) using local language model inference (Ollama/llama3.1:8b) to generate scientific insights with rationales, with graceful fallback to rule-based heuristics for reliability. Built on pre-computed regulatory networks derived from 500K+ single-cell RNA-seq profiles from CellxGene Data Portal (processed via ARACNe algorithm), perturbation analysis ranks therapeutic targets using network centrality metrics (PageRank, out-degree centrality), analyzing all upstream regulators comprehensively and successfully identifying experimentally validated regulators. Framework validation on colorectal cancer biomarkers showed 100% concordance with published literature across five genes and complete perturbation analysis of 99 regulators. Perturbation analysis successfully identified experimentally validated TP53 regulators (WWTR1, YAP1, CHD4 from Hippo pathway) alongside novel testable hypotheses (RBPMS, PRRX2), demonstrating reliable hypothesis generation for experimental prioritization. Natural language interface via Claude Desktop makes sophisticated gene analysis accessible without programming.</a:t>
+              <a:t>RegNetAgents is a validated LLM-powered multi-agent AI framework that automates gene regulatory network analysis through intelligent workflow orchestration, transforming labor-intensive manual processes into second-scale automated analysis. The system deploys four specialized LLM-powered domain agents (cancer biology, drug discovery, clinical relevance, systems biology) using local language model inference (Ollama/llama3.1:8b) to generate scientific insights with rationales, with graceful fallback to rule-based heuristics for reliability. Built on pre-computed regulatory networks derived from 500K+ single-cell RNA-seq profiles from CellxGene Data Portal (processed via ARACNe algorithm), perturbation analysis ranks therapeutic targets using network centrality metrics (PageRank, out-degree centrality), analyzing all upstream regulators comprehensively and successfully identifying experimentally validated regulators. Framework validation on colorectal cancer biomarkers showed 100% concordance with published literature across five genes and complete perturbation analysis of 99 regulators. Perturbation analysis successfully identified experimentally validated TP53 regulators (WWTR1, YAP1, CHD4 from Hippo pathway) alongside novel testable hypotheses (RBPMS, PRRX2), demonstrating reliable hypothesis generation for experimental prioritization. Natural language interface via Claude Desktop makes sophisticated gene analysis accessible without programming.</a:t>
             </a:r>
             <a:br/>
             <a:br/>
             <a:r>
-              <a:t>KEY INNOVATION: LLM-Powered Agents with Scientific Rationales • Local Inference (Ollama) • Hours → Seconds (15-62 sec with LLM, &lt;1 sec rule-based) • 4 Parallel Domain Agents • Complete Perturbation Analysis (All Regulators) • Conversational Interface • Graceful Fallback Architecture</a:t>
+              <a:t>KEY INNOVATION: LLM-Powered Agents with Scientific Rationales • Local Inference (Ollama) • Manual → Seconds (15-62 sec with LLM, &lt;1 sec rule-based) • 4 Parallel Domain Agents • Complete Perturbation Analysis (All Regulators) • Conversational Interface • Graceful Fallback Architecture</a:t>
             </a:r>
           </a:p>
         </p:txBody>
@@ -3542,7 +3542,7 @@
               </a:defRPr>
             </a:pPr>
             <a:r>
-              <a:t>Single gene (rule-based): Hours → 0.68 sec</a:t>
+              <a:t>Single gene (rule-based): Manual → 0.68 sec</a:t>
             </a:r>
           </a:p>
           <a:p>
@@ -3557,7 +3557,7 @@
               </a:defRPr>
             </a:pPr>
             <a:r>
-              <a:t>Single gene (LLM-powered): Hours → 15 sec</a:t>
+              <a:t>Single gene (LLM-powered): Manual → 15 sec</a:t>
             </a:r>
           </a:p>
           <a:p>
@@ -3572,7 +3572,7 @@
               </a:defRPr>
             </a:pPr>
             <a:r>
-              <a:t>5 genes (LLM-powered): Hours → 62 sec</a:t>
+              <a:t>5 genes (LLM-powered): Manual → 62 sec</a:t>
             </a:r>
           </a:p>
         </p:txBody>
@@ -3683,7 +3683,7 @@
               </a:defRPr>
             </a:pPr>
             <a:r>
-              <a:t>Manual analysis across multiple domains (cancer, drug, clinical) requires hours of work per gene</a:t>
+              <a:t>Manual analysis across multiple domains (cancer, drug, clinical) requires labor-intensive effort per gene</a:t>
             </a:r>
           </a:p>
           <a:p>

</xml_diff>

<commit_message>
Increase Figure 4 fonts for poster readability and update documentation to use classification language
- Increased all font sizes in Figure 4 (titles 11pt→16pt, body text 7-8pt→10-13pt) for conference poster readability
- Updated docs/REGNETAGENTS_CONFERENCE_POSTER.md to use "classification" instead of "scoring" terminology (consistent with Option 3 manuscript revisions)
- Regenerated conference poster PowerPoint with updated language
- Regenerated preprint DOCX and PDF with Option 3 revisions
- All figures and documentation now consistent with validated metrics approach

🤖 Generated with [Claude Code](https://claude.com/claude-code)

Co-Authored-By: Claude <noreply@anthropic.com>
</commit_message>
<xml_diff>
--- a/biorxiv/REGNETAGENTS_CONFERENCE_POSTER.pptx
+++ b/biorxiv/REGNETAGENTS_CONFERENCE_POSTER.pptx
@@ -5149,7 +5149,7 @@
               </a:defRPr>
             </a:pPr>
             <a:r>
-              <a:t>**LLM-generated insights** using local Ollama inference (llama3.1:8b); evaluates cancer biology relevance with scientific rationales; graceful fallback to rule-based heuristics if LLM unavailable → AI-generated oncogenic potential assessment with rationale, tumor suppressor likelihood with explanation, therapeutic target scoring with scientific justification; falls back to network connectivity-based heuristics for reliability</a:t>
+              <a:t>**LLM-generated insights** using local Ollama inference (llama3.1:8b); evaluates cancer biology relevance with scientific rationales; graceful fallback to rule-based heuristics if LLM unavailable → AI-generated oncogenic potential classification with rationale, tumor suppressor likelihood with explanation, therapeutic target classification with scientific justification; falls back to network connectivity-based heuristics for reliability</a:t>
             </a:r>
           </a:p>
           <a:p>
@@ -5176,7 +5176,7 @@
               </a:defRPr>
             </a:pPr>
             <a:r>
-              <a:t>**LLM-generated insights** using local Ollama inference; analyzes therapeutic potential with scientific rationales for druggability assessments and intervention strategies → AI-generated druggability scoring with rationale, intervention strategy recommendations with explanation, development timeline estimates with justification; falls back to connectivity-based rules for reliability</a:t>
+              <a:t>**LLM-generated insights** using local Ollama inference; analyzes therapeutic potential with scientific rationales for druggability assessments and intervention strategies → AI-generated druggability assessment with rationale, intervention strategy recommendations with explanation, development timeline estimates with justification; falls back to connectivity-based rules for reliability</a:t>
             </a:r>
           </a:p>
           <a:p>
@@ -6935,8 +6935,8 @@
         </p:nvSpPr>
         <p:spPr>
           <a:xfrm>
-            <a:off x="32461200" y="12344400"/>
-            <a:ext cx="10972800" cy="228600"/>
+            <a:off x="32461200" y="13075920"/>
+            <a:ext cx="10972800" cy="411480"/>
           </a:xfrm>
           <a:prstGeom prst="rect">
             <a:avLst/>
@@ -6951,7 +6951,7 @@
           <a:p/>
           <a:p>
             <a:pPr algn="ctr">
-              <a:defRPr sz="1400" b="1">
+              <a:defRPr sz="3000" b="1">
                 <a:solidFill>
                   <a:srgbClr val="FF8800"/>
                 </a:solidFill>
@@ -6979,8 +6979,8 @@
         </p:blipFill>
         <p:spPr>
           <a:xfrm>
-            <a:off x="32644080" y="12618720"/>
-            <a:ext cx="10607040" cy="7472082"/>
+            <a:off x="32644080" y="13350240"/>
+            <a:ext cx="10607040" cy="7619030"/>
           </a:xfrm>
           <a:prstGeom prst="rect">
             <a:avLst/>
@@ -6995,7 +6995,7 @@
         </p:nvSpPr>
         <p:spPr>
           <a:xfrm>
-            <a:off x="32461200" y="20227962"/>
+            <a:off x="32461200" y="21106430"/>
             <a:ext cx="10972800" cy="731520"/>
           </a:xfrm>
           <a:prstGeom prst="rect">
@@ -7052,7 +7052,7 @@
         </p:nvSpPr>
         <p:spPr>
           <a:xfrm>
-            <a:off x="32461200" y="21142362"/>
+            <a:off x="32461200" y="22020830"/>
             <a:ext cx="10972800" cy="2926080"/>
           </a:xfrm>
           <a:prstGeom prst="rect">
@@ -7167,7 +7167,7 @@
         </p:nvSpPr>
         <p:spPr>
           <a:xfrm>
-            <a:off x="32461200" y="24799962"/>
+            <a:off x="32461200" y="25678430"/>
             <a:ext cx="10972800" cy="731520"/>
           </a:xfrm>
           <a:prstGeom prst="rect">
@@ -7224,7 +7224,7 @@
         </p:nvSpPr>
         <p:spPr>
           <a:xfrm>
-            <a:off x="32461200" y="25714362"/>
+            <a:off x="32461200" y="26592830"/>
             <a:ext cx="10972800" cy="2743200"/>
           </a:xfrm>
           <a:prstGeom prst="rect">
@@ -7353,7 +7353,7 @@
         </p:nvSpPr>
         <p:spPr>
           <a:xfrm>
-            <a:off x="32461200" y="28457562"/>
+            <a:off x="32461200" y="29336030"/>
             <a:ext cx="10972800" cy="731520"/>
           </a:xfrm>
           <a:prstGeom prst="rect">
@@ -7410,7 +7410,7 @@
         </p:nvSpPr>
         <p:spPr>
           <a:xfrm>
-            <a:off x="32461200" y="29371962"/>
+            <a:off x="32461200" y="30250430"/>
             <a:ext cx="6858000" cy="3200400"/>
           </a:xfrm>
           <a:prstGeom prst="rect">
@@ -7500,7 +7500,7 @@
         </p:nvSpPr>
         <p:spPr>
           <a:xfrm>
-            <a:off x="39776400" y="29371962"/>
+            <a:off x="39776400" y="30250430"/>
             <a:ext cx="3200400" cy="3200400"/>
           </a:xfrm>
           <a:prstGeom prst="rect">

</xml_diff>

<commit_message>
Regenerate conference poster with updated speedup language
Updated PowerPoint poster to reflect "orders of magnitude speedup"
instead of "480-24,000× speedup" in Figure 4 caption.

Previous commit updated the markdown and script but missed regenerating
the .pptx file.

🤖 Generated with Claude Code (https://claude.com/claude-code)

Co-Authored-By: Claude <noreply@anthropic.com>
</commit_message>
<xml_diff>
--- a/biorxiv/REGNETAGENTS_CONFERENCE_POSTER.pptx
+++ b/biorxiv/REGNETAGENTS_CONFERENCE_POSTER.pptx
@@ -3284,7 +3284,7 @@
               </a:defRPr>
             </a:pPr>
             <a:r>
-              <a:t>RegNetAgents is an LLM-powered multi-agent AI framework that automates gene regulatory network analysis through intelligent workflow orchestration, transforming labor-intensive manual processes into second-scale automated analysis. The system deploys four specialized LLM-powered domain agents (cancer biology, drug discovery, clinical relevance, systems biology) using local language model inference (Ollama/llama3.1:8b) to generate scientific insights with rationales, with graceful fallback to rule-based heuristics for reliability. Built on pre-computed regulatory networks from 500K+ single-cell RNA-seq profiles (ARACNe algorithm via GREmLIN team, CELLxGENE Data Portal), the framework integrates network modeling, automated perturbation analysis using network centrality metrics (PageRank, out-degree centrality), pathway enrichment with statistical validation (Reactome, FDR &lt; 0.05), and multi-domain interpretation into a conversational interface via Model Context Protocol and Claude Desktop. Framework validation on colorectal cancer biomarkers demonstrated 100% concordance with published literature across five genes. Perturbation analysis successfully identified experimentally validated TP53 regulators (WWTR1, YAP1, CHD4 from Hippo pathway) alongside novel testable hypotheses (RBPMS, PRRX2), demonstrating reliable hypothesis generation for experimental prioritization. Complete analysis of 99 regulators across 5 genes completed in 15-62 seconds depending on mode, representing 480-24,000× speedup over traditional manual approaches that typically require 2-4 hours per gene. Natural language interface makes sophisticated gene analysis accessible without programming expertise.</a:t>
+              <a:t>RegNetAgents is an LLM-powered multi-agent AI framework that automates gene regulatory network analysis through intelligent workflow orchestration, transforming labor-intensive manual processes into second-scale automated analysis. The system deploys four specialized LLM-powered domain agents (cancer biology, drug discovery, clinical relevance, systems biology) using local language model inference (Ollama/llama3.1:8b) to generate scientific insights with rationales, with graceful fallback to rule-based heuristics for reliability. Built on pre-computed regulatory networks from 500K+ single-cell RNA-seq profiles (ARACNe algorithm via GREmLIN team, CELLxGENE Data Portal), the framework integrates network modeling, automated perturbation analysis using network centrality metrics (PageRank, out-degree centrality), pathway enrichment with statistical validation (Reactome, FDR &lt; 0.05), and multi-domain interpretation into a conversational interface via Model Context Protocol and Claude Desktop. Framework validation on colorectal cancer biomarkers demonstrated 100% concordance with published literature across five genes. Perturbation analysis correctly ranked experimentally validated TP53 regulators (WWTR1, YAP1, CHD4) among the top candidates, demonstrating concordance with published literature. Additional high-ranking regulators (RBPMS, PRRX2, THRA, IKZF2) represent novel hypotheses prioritized for experimental validation. Complete analysis of 99 regulators across 5 genes completed in 15-62 seconds depending on mode, representing orders of magnitude speedup over traditional manual approaches that typically require 2-4 hours per gene. Natural language interface makes sophisticated gene analysis accessible without programming expertise.</a:t>
             </a:r>
           </a:p>
         </p:txBody>
@@ -6953,7 +6953,7 @@
               </a:defRPr>
             </a:pPr>
             <a:r>
-              <a:t>Figure 4: Framework Performance (480-24,000× speedup)</a:t>
+              <a:t>Figure 4: Framework Performance (orders of magnitude speedup)</a:t>
             </a:r>
           </a:p>
         </p:txBody>

</xml_diff>

<commit_message>
Update all documentation with consistent terminology
Replaced "perturbation analysis" → "therapeutic target prioritization" in:
- README.md (6 instances)
- docs/REGNETAGENTS_Analysis_Pipeline.md (3 instances)
- docs/REGNETAGENTS_MCP_SETUP.md (4 instances)
- docs/REGNETAGENTS_CONFERENCE_POSTER.md (11 instances)
- Regenerated conference poster PPTX with updated terminology

Reason: Consistency with manuscript changes. "Therapeutic target prioritization" more accurately describes network topology-based ranking than "perturbation analysis."

🤖 Generated with [Claude Code](https://claude.com/claude-code)

Co-Authored-By: Claude <noreply@anthropic.com>
</commit_message>
<xml_diff>
--- a/biorxiv/REGNETAGENTS_CONFERENCE_POSTER.pptx
+++ b/biorxiv/REGNETAGENTS_CONFERENCE_POSTER.pptx
@@ -3284,7 +3284,7 @@
               </a:defRPr>
             </a:pPr>
             <a:r>
-              <a:t>RegNetAgents is an LLM-powered multi-agent AI framework that automates gene regulatory network analysis through intelligent workflow orchestration, transforming labor-intensive manual processes into second-scale automated analysis. The system deploys four specialized domain agents (cancer biology, drug discovery, clinical relevance, systems biology) using local language model inference to generate scientific insights with rationales, with graceful fallback to rule-based heuristics for reliability. Built on pre-computed regulatory networks from 500K+ single-cell RNA-seq profiles, the framework integrates network modeling, automated perturbation analysis using network centrality metrics (PageRank, degree centrality), pathway enrichment, and multi-domain interpretation into a conversational interface via Claude Desktop. Framework demonstration on colorectal cancer biomarkers showed complete concordance with published literature across a limited five-gene sample. Perturbation analysis identified literature-supported TP53 interactors (WWTR1, YAP1, CHD4) among top-ranked candidates based on network topology; additional high-ranking regulators (RBPMS, PRRX2, THRA, IKZF2) represent novel hypotheses for experimental validation. Complete analysis of 99 regulators across 5 genes completed in 15-62 seconds, representing orders of magnitude speedup over traditional manual approaches. Natural language interface makes sophisticated gene analysis accessible without programming expertise.</a:t>
+              <a:t>RegNetAgents is an LLM-powered multi-agent AI framework that automates gene regulatory network analysis through intelligent workflow orchestration, transforming labor-intensive manual processes into second-scale automated analysis. The system deploys four specialized domain agents (cancer biology, drug discovery, clinical relevance, systems biology) using local language model inference to generate scientific insights with rationales, with graceful fallback to rule-based heuristics for reliability. Built on pre-computed regulatory networks from 500K+ single-cell RNA-seq profiles, the framework integrates network modeling, automated therapeutic target prioritization using network centrality metrics (PageRank, degree centrality), pathway enrichment, and multi-domain interpretation into a conversational interface via Claude Desktop. Framework demonstration on colorectal cancer biomarkers showed complete concordance with published literature across a limited five-gene sample. Perturbation analysis identified literature-supported TP53 interactors (WWTR1, YAP1, CHD4) among top-ranked candidates based on network topology; additional high-ranking regulators (RBPMS, PRRX2, THRA, IKZF2) represent novel hypotheses for experimental validation. Complete analysis of 99 regulators across 5 genes completed in 15-62 seconds, representing orders of magnitude speedup over traditional manual approaches. Natural language interface makes sophisticated gene analysis accessible without programming expertise.</a:t>
             </a:r>
           </a:p>
         </p:txBody>
@@ -3473,7 +3473,7 @@
               </a:defRPr>
             </a:pPr>
             <a:r>
-              <a:t>Perturbation Analysis: Rank regulators by network centrality to prioritize candidate regulators for validation</a:t>
+              <a:t>Therapeutic Target Prioritization: Rank regulators by network centrality to prioritize candidate regulators for validation</a:t>
             </a:r>
           </a:p>
           <a:p>
@@ -5090,7 +5090,7 @@
               </a:defRPr>
             </a:pPr>
             <a:r>
-              <a:t>Analyzes gene regulatory networks to identify upstream regulators and downstream targets; determines regulatory role (hub/intermediate/terminal); performs cross-cell-type comparison; ranks upstream regulators to identify therapeutic targets using network centrality metrics (PageRank, out-degree centrality) → Gene position in regulatory hierarchy, regulatory strength, cell-type specificity; perturbation analysis with centrality-based rankings (PageRank primary, out-degree secondary), cascade effects, network connectivity assessment</a:t>
+              <a:t>Analyzes gene regulatory networks to identify upstream regulators and downstream targets; determines regulatory role (hub/intermediate/terminal); performs cross-cell-type comparison; ranks upstream regulators to identify therapeutic targets using network centrality metrics (PageRank, out-degree centrality) → Gene position in regulatory hierarchy, regulatory strength, cell-type specificity; therapeutic target prioritization with centrality-based rankings (PageRank primary, out-degree secondary), cascade effects, network connectivity assessment</a:t>
             </a:r>
           </a:p>
           <a:p>

</xml_diff>